<commit_message>
change content of presentation file
</commit_message>
<xml_diff>
--- a/presentation/presentation.pptx
+++ b/presentation/presentation.pptx
@@ -18,6 +18,7 @@
     <p:sldId id="263" r:id="rId15"/>
     <p:sldId id="264" r:id="rId16"/>
     <p:sldId id="265" r:id="rId17"/>
+    <p:sldId id="266" r:id="rId18"/>
   </p:sldIdLst>
   <p:sldSz cx="9906000" cy="6858000"/>
   <p:notesSz cx="6858000" cy="9144000"/>
@@ -846,7 +847,7 @@
           </p:nvSpPr>
           <p:spPr>
             <a:xfrm>
-              <a:off x="-1" y="74613"/>
+              <a:off x="-1" y="74612"/>
               <a:ext cx="9906004" cy="215901"/>
             </a:xfrm>
             <a:prstGeom prst="rect">
@@ -2101,8 +2102,8 @@
         </p:nvSpPr>
         <p:spPr>
           <a:xfrm>
-            <a:off x="431800" y="1142999"/>
-            <a:ext cx="7689850" cy="1185799"/>
+            <a:off x="431800" y="1143000"/>
+            <a:ext cx="7689850" cy="1185798"/>
           </a:xfrm>
           <a:prstGeom prst="rect">
             <a:avLst/>
@@ -2170,8 +2171,8 @@
         </p:nvSpPr>
         <p:spPr>
           <a:xfrm>
-            <a:off x="449261" y="2514599"/>
-            <a:ext cx="7342190" cy="1935099"/>
+            <a:off x="449261" y="2514600"/>
+            <a:ext cx="7342190" cy="1935098"/>
           </a:xfrm>
           <a:prstGeom prst="rect">
             <a:avLst/>
@@ -2411,8 +2412,8 @@
         </p:nvSpPr>
         <p:spPr>
           <a:xfrm>
-            <a:off x="900330" y="4648199"/>
-            <a:ext cx="1558561" cy="396239"/>
+            <a:off x="900330" y="4648200"/>
+            <a:ext cx="1558561" cy="396238"/>
           </a:xfrm>
           <a:prstGeom prst="rect">
             <a:avLst/>
@@ -2469,7 +2470,7 @@
         </p:blipFill>
         <p:spPr>
           <a:xfrm>
-            <a:off x="6589016" y="6138614"/>
+            <a:off x="6589017" y="6138614"/>
             <a:ext cx="1352327" cy="564709"/>
           </a:xfrm>
           <a:prstGeom prst="rect">
@@ -2556,8 +2557,8 @@
         </p:blipFill>
         <p:spPr>
           <a:xfrm>
-            <a:off x="1818501" y="6121371"/>
-            <a:ext cx="2304943" cy="599285"/>
+            <a:off x="1818501" y="6121370"/>
+            <a:ext cx="2304943" cy="599286"/>
           </a:xfrm>
           <a:prstGeom prst="rect">
             <a:avLst/>
@@ -2643,8 +2644,8 @@
         </p:blipFill>
         <p:spPr>
           <a:xfrm>
-            <a:off x="7120531" y="1898650"/>
-            <a:ext cx="1736925" cy="1736924"/>
+            <a:off x="7120532" y="1898650"/>
+            <a:ext cx="1736924" cy="1736924"/>
           </a:xfrm>
           <a:prstGeom prst="rect">
             <a:avLst/>
@@ -2682,7 +2683,7 @@
       </p:grpSpPr>
       <p:sp>
         <p:nvSpPr>
-          <p:cNvPr id="82" name="Shape 82"/>
+          <p:cNvPr id="81" name="Shape 81"/>
           <p:cNvSpPr/>
           <p:nvPr>
             <p:ph type="sldNum" sz="quarter" idx="4294967295"/>
@@ -2690,8 +2691,8 @@
         </p:nvSpPr>
         <p:spPr>
           <a:xfrm>
-            <a:off x="9506039" y="6556374"/>
-            <a:ext cx="247562" cy="245999"/>
+            <a:off x="9506039" y="6556375"/>
+            <a:ext cx="247561" cy="245998"/>
           </a:xfrm>
           <a:prstGeom prst="rect">
             <a:avLst/>
@@ -2738,7 +2739,142 @@
       </p:sp>
       <p:sp>
         <p:nvSpPr>
-          <p:cNvPr id="83" name="Shape 83"/>
+          <p:cNvPr id="82" name="Shape 82"/>
+          <p:cNvSpPr/>
+          <p:nvPr>
+            <p:ph type="title"/>
+          </p:nvPr>
+        </p:nvSpPr>
+        <p:spPr>
+          <a:prstGeom prst="rect">
+            <a:avLst/>
+          </a:prstGeom>
+        </p:spPr>
+        <p:txBody>
+          <a:bodyPr/>
+          <a:lstStyle/>
+          <a:p>
+            <a:pPr/>
+            <a:r>
+              <a:t>Live Demo</a:t>
+            </a:r>
+          </a:p>
+        </p:txBody>
+      </p:sp>
+      <p:pic>
+        <p:nvPicPr>
+          <p:cNvPr id="83" name="pasted-image.png"/>
+          <p:cNvPicPr>
+            <a:picLocks noChangeAspect="1"/>
+          </p:cNvPicPr>
+          <p:nvPr/>
+        </p:nvPicPr>
+        <p:blipFill>
+          <a:blip r:embed="rId2">
+            <a:extLst/>
+          </a:blip>
+          <a:stretch>
+            <a:fillRect/>
+          </a:stretch>
+        </p:blipFill>
+        <p:spPr>
+          <a:xfrm>
+            <a:off x="232363" y="978211"/>
+            <a:ext cx="9441274" cy="5206378"/>
+          </a:xfrm>
+          <a:prstGeom prst="rect">
+            <a:avLst/>
+          </a:prstGeom>
+          <a:ln w="12700">
+            <a:miter lim="400000"/>
+          </a:ln>
+        </p:spPr>
+      </p:pic>
+    </p:spTree>
+  </p:cSld>
+  <p:clrMapOvr>
+    <a:masterClrMapping/>
+  </p:clrMapOvr>
+  <p:transition xmlns:p14="http://schemas.microsoft.com/office/powerpoint/2010/main" spd="med" advClick="1" p14:dur="1000"/>
+</p:sld>
+</file>
+
+<file path=ppt/slides/slide11.xml><?xml version="1.0" encoding="utf-8"?>
+<p:sld xmlns:a="http://schemas.openxmlformats.org/drawingml/2006/main" xmlns:r="http://schemas.openxmlformats.org/officeDocument/2006/relationships" xmlns:p="http://schemas.openxmlformats.org/presentationml/2006/main" showMasterSp="1" showMasterPhAnim="1">
+  <p:cSld>
+    <p:spTree>
+      <p:nvGrpSpPr>
+        <p:cNvPr id="1" name=""/>
+        <p:cNvGrpSpPr/>
+        <p:nvPr/>
+      </p:nvGrpSpPr>
+      <p:grpSpPr>
+        <a:xfrm>
+          <a:off x="0" y="0"/>
+          <a:ext cx="0" cy="0"/>
+          <a:chOff x="0" y="0"/>
+          <a:chExt cx="0" cy="0"/>
+        </a:xfrm>
+      </p:grpSpPr>
+      <p:sp>
+        <p:nvSpPr>
+          <p:cNvPr id="85" name="Shape 85"/>
+          <p:cNvSpPr/>
+          <p:nvPr>
+            <p:ph type="sldNum" sz="quarter" idx="4294967295"/>
+          </p:nvPr>
+        </p:nvSpPr>
+        <p:spPr>
+          <a:xfrm>
+            <a:off x="9515403" y="6556375"/>
+            <a:ext cx="238198" cy="245998"/>
+          </a:xfrm>
+          <a:prstGeom prst="rect">
+            <a:avLst/>
+          </a:prstGeom>
+          <a:extLst>
+            <a:ext uri="{C572A759-6A51-4108-AA02-DFA0A04FC94B}">
+              <ma14:wrappingTextBoxFlag xmlns:ma14="http://schemas.microsoft.com/office/mac/drawingml/2011/main" val="1"/>
+            </a:ext>
+          </a:extLst>
+        </p:spPr>
+        <p:txBody>
+          <a:bodyPr/>
+          <a:lstStyle>
+            <a:lvl1pPr>
+              <a:tabLst>
+                <a:tab pos="457200" algn="l"/>
+                <a:tab pos="914400" algn="l"/>
+                <a:tab pos="1371600" algn="l"/>
+                <a:tab pos="1828800" algn="l"/>
+                <a:tab pos="2286000" algn="l"/>
+                <a:tab pos="2743200" algn="l"/>
+                <a:tab pos="3200400" algn="l"/>
+                <a:tab pos="3657600" algn="l"/>
+                <a:tab pos="4114800" algn="l"/>
+                <a:tab pos="4572000" algn="l"/>
+                <a:tab pos="5029200" algn="l"/>
+                <a:tab pos="5486400" algn="l"/>
+                <a:tab pos="5943600" algn="l"/>
+                <a:tab pos="6400800" algn="l"/>
+                <a:tab pos="6858000" algn="l"/>
+                <a:tab pos="7315200" algn="l"/>
+                <a:tab pos="7772400" algn="l"/>
+                <a:tab pos="8229600" algn="l"/>
+                <a:tab pos="8686800" algn="l"/>
+                <a:tab pos="9144000" algn="l"/>
+              </a:tabLst>
+            </a:lvl1pPr>
+          </a:lstStyle>
+          <a:p>
+            <a:pPr/>
+            <a:fld id="{86CB4B4D-7CA3-9044-876B-883B54F8677D}" type="slidenum"/>
+          </a:p>
+        </p:txBody>
+      </p:sp>
+      <p:sp>
+        <p:nvSpPr>
+          <p:cNvPr id="86" name="Shape 86"/>
           <p:cNvSpPr/>
           <p:nvPr>
             <p:ph type="title"/>
@@ -2746,8 +2882,8 @@
         </p:nvSpPr>
         <p:spPr>
           <a:xfrm>
-            <a:off x="3594099" y="2994818"/>
-            <a:ext cx="3334943" cy="1325564"/>
+            <a:off x="3594100" y="2994817"/>
+            <a:ext cx="3334942" cy="1325565"/>
           </a:xfrm>
           <a:prstGeom prst="rect">
             <a:avLst/>
@@ -2800,8 +2936,8 @@
         </p:nvSpPr>
         <p:spPr>
           <a:xfrm>
-            <a:off x="9626600" y="6556374"/>
-            <a:ext cx="127001" cy="152401"/>
+            <a:off x="9626600" y="6556375"/>
+            <a:ext cx="127001" cy="152400"/>
           </a:xfrm>
           <a:prstGeom prst="rect">
             <a:avLst/>
@@ -2935,7 +3071,7 @@
               <a:buFont typeface="Arial"/>
             </a:pPr>
             <a:r>
-              <a:t>Sequence Diagram</a:t>
+              <a:t>Recommendation Criteria</a:t>
             </a:r>
           </a:p>
           <a:p>
@@ -3000,8 +3136,8 @@
         </p:nvSpPr>
         <p:spPr>
           <a:xfrm>
-            <a:off x="9576670" y="6556374"/>
-            <a:ext cx="176931" cy="245999"/>
+            <a:off x="9576670" y="6556375"/>
+            <a:ext cx="176931" cy="245998"/>
           </a:xfrm>
           <a:prstGeom prst="rect">
             <a:avLst/>
@@ -3055,10 +3191,6 @@
           </p:nvPr>
         </p:nvSpPr>
         <p:spPr>
-          <a:xfrm>
-            <a:off x="495300" y="274636"/>
-            <a:ext cx="8915400" cy="1325564"/>
-          </a:xfrm>
           <a:prstGeom prst="rect">
             <a:avLst/>
           </a:prstGeom>
@@ -3260,8 +3392,8 @@
         </p:nvSpPr>
         <p:spPr>
           <a:xfrm>
-            <a:off x="495300" y="952499"/>
-            <a:ext cx="8915400" cy="5384801"/>
+            <a:off x="495300" y="952500"/>
+            <a:ext cx="8915400" cy="5384800"/>
           </a:xfrm>
           <a:prstGeom prst="rect">
             <a:avLst/>
@@ -3324,7 +3456,7 @@
         <p:spPr>
           <a:xfrm>
             <a:off x="4718268" y="3513491"/>
-            <a:ext cx="1140651" cy="2785818"/>
+            <a:ext cx="1140650" cy="2785818"/>
           </a:xfrm>
           <a:prstGeom prst="rect">
             <a:avLst/>
@@ -3534,13 +3666,144 @@
           <p:cNvPr id="62" name="Shape 62"/>
           <p:cNvSpPr/>
           <p:nvPr>
+            <p:ph type="title"/>
+          </p:nvPr>
+        </p:nvSpPr>
+        <p:spPr>
+          <a:prstGeom prst="rect">
+            <a:avLst/>
+          </a:prstGeom>
+        </p:spPr>
+        <p:txBody>
+          <a:bodyPr/>
+          <a:lstStyle/>
+          <a:p>
+            <a:pPr lvl="1" marL="0" indent="0">
+              <a:buSzTx/>
+              <a:buNone/>
+            </a:pPr>
+            <a:r>
+              <a:t>Recommendation Criteria</a:t>
+            </a:r>
+          </a:p>
+        </p:txBody>
+      </p:sp>
+      <p:sp>
+        <p:nvSpPr>
+          <p:cNvPr id="63" name="Shape 63"/>
+          <p:cNvSpPr/>
+          <p:nvPr>
+            <p:ph type="body" idx="1"/>
+          </p:nvPr>
+        </p:nvSpPr>
+        <p:spPr>
+          <a:prstGeom prst="rect">
+            <a:avLst/>
+          </a:prstGeom>
+        </p:spPr>
+        <p:txBody>
+          <a:bodyPr/>
+          <a:lstStyle/>
+          <a:p>
+            <a:pPr/>
+            <a:r>
+              <a:t>Users need to login to view recommendations</a:t>
+            </a:r>
+          </a:p>
+          <a:p>
+            <a:pPr/>
+            <a:r>
+              <a:t>New users will initially have no recommendations</a:t>
+            </a:r>
+          </a:p>
+          <a:p>
+            <a:pPr/>
+            <a:r>
+              <a:t>If users have search &amp; click history:</a:t>
+            </a:r>
+          </a:p>
+          <a:p>
+            <a:pPr lvl="1" marL="492125" indent="-228599">
+              <a:buChar char="•"/>
+              <a:defRPr sz="2200"/>
+            </a:pPr>
+            <a:r>
+              <a:t>If user car searches does not have similar data with other users, the recommendation is based on his own search &amp; click history sorted according to frequency</a:t>
+            </a:r>
+          </a:p>
+          <a:p>
+            <a:pPr lvl="1" marL="473075" indent="-209549">
+              <a:buChar char="•"/>
+            </a:pPr>
+            <a:r>
+              <a:rPr sz="2200"/>
+              <a:t>If user car searches have similar data with other users:</a:t>
+            </a:r>
+            <a:endParaRPr sz="2200"/>
+          </a:p>
+          <a:p>
+            <a:pPr lvl="2" marL="758825" indent="-228600">
+              <a:buChar char="•"/>
+              <a:defRPr sz="2000"/>
+            </a:pPr>
+            <a:r>
+              <a:t>Retrieve all associated data and use </a:t>
+            </a:r>
+            <a:r>
+              <a:rPr i="1"/>
+              <a:t>Apriori </a:t>
+            </a:r>
+            <a:r>
+              <a:t>to order based on the frequent </a:t>
+            </a:r>
+            <a:r>
+              <a:rPr i="1"/>
+              <a:t>Car ID </a:t>
+            </a:r>
+            <a:r>
+              <a:t>given a minimum support.</a:t>
+            </a:r>
+          </a:p>
+        </p:txBody>
+      </p:sp>
+    </p:spTree>
+  </p:cSld>
+  <p:clrMapOvr>
+    <a:masterClrMapping/>
+  </p:clrMapOvr>
+  <p:transition xmlns:p14="http://schemas.microsoft.com/office/powerpoint/2010/main" spd="med" advClick="1" p14:dur="1000"/>
+</p:sld>
+</file>
+
+<file path=ppt/slides/slide8.xml><?xml version="1.0" encoding="utf-8"?>
+<p:sld xmlns:a="http://schemas.openxmlformats.org/drawingml/2006/main" xmlns:r="http://schemas.openxmlformats.org/officeDocument/2006/relationships" xmlns:p="http://schemas.openxmlformats.org/presentationml/2006/main" showMasterSp="1" showMasterPhAnim="1">
+  <p:cSld>
+    <p:spTree>
+      <p:nvGrpSpPr>
+        <p:cNvPr id="1" name=""/>
+        <p:cNvGrpSpPr/>
+        <p:nvPr/>
+      </p:nvGrpSpPr>
+      <p:grpSpPr>
+        <a:xfrm>
+          <a:off x="0" y="0"/>
+          <a:ext cx="0" cy="0"/>
+          <a:chOff x="0" y="0"/>
+          <a:chExt cx="0" cy="0"/>
+        </a:xfrm>
+      </p:grpSpPr>
+      <p:sp>
+        <p:nvSpPr>
+          <p:cNvPr id="65" name="Shape 65"/>
+          <p:cNvSpPr/>
+          <p:nvPr>
             <p:ph type="sldNum" sz="quarter" idx="4294967295"/>
           </p:nvPr>
         </p:nvSpPr>
         <p:spPr>
           <a:xfrm>
-            <a:off x="9626600" y="6556374"/>
-            <a:ext cx="127001" cy="152401"/>
+            <a:off x="9626600" y="6556375"/>
+            <a:ext cx="127001" cy="152400"/>
           </a:xfrm>
           <a:prstGeom prst="rect">
             <a:avLst/>
@@ -3594,7 +3857,7 @@
       </p:sp>
       <p:sp>
         <p:nvSpPr>
-          <p:cNvPr id="63" name="Shape 63"/>
+          <p:cNvPr id="66" name="Shape 66"/>
           <p:cNvSpPr/>
           <p:nvPr>
             <p:ph type="title"/>
@@ -3622,7 +3885,7 @@
       </p:sp>
       <p:sp>
         <p:nvSpPr>
-          <p:cNvPr id="64" name="Shape 64"/>
+          <p:cNvPr id="67" name="Shape 67"/>
           <p:cNvSpPr/>
           <p:nvPr>
             <p:ph type="body" idx="1"/>
@@ -3732,7 +3995,7 @@
       </p:sp>
       <p:pic>
         <p:nvPicPr>
-          <p:cNvPr id="65" name="image7.tif"/>
+          <p:cNvPr id="68" name="image7.tif"/>
           <p:cNvPicPr>
             <a:picLocks noChangeAspect="1"/>
           </p:cNvPicPr>
@@ -3761,7 +4024,7 @@
       </p:pic>
       <p:pic>
         <p:nvPicPr>
-          <p:cNvPr id="66" name="image11.tif"/>
+          <p:cNvPr id="69" name="image11.tif"/>
           <p:cNvPicPr>
             <a:picLocks noChangeAspect="1"/>
           </p:cNvPicPr>
@@ -3777,7 +4040,7 @@
         </p:blipFill>
         <p:spPr>
           <a:xfrm>
-            <a:off x="7826146" y="3988245"/>
+            <a:off x="7826147" y="3988246"/>
             <a:ext cx="841377" cy="841376"/>
           </a:xfrm>
           <a:prstGeom prst="rect">
@@ -3790,7 +4053,7 @@
       </p:pic>
       <p:pic>
         <p:nvPicPr>
-          <p:cNvPr id="67" name="image12.tif"/>
+          <p:cNvPr id="70" name="image12.tif"/>
           <p:cNvPicPr>
             <a:picLocks noChangeAspect="1"/>
           </p:cNvPicPr>
@@ -3819,7 +4082,7 @@
       </p:pic>
       <p:pic>
         <p:nvPicPr>
-          <p:cNvPr id="68" name="pasted-image.tiff"/>
+          <p:cNvPr id="71" name="pasted-image.tiff"/>
           <p:cNvPicPr>
             <a:picLocks noChangeAspect="1"/>
           </p:cNvPicPr>
@@ -3836,7 +4099,7 @@
         <p:spPr>
           <a:xfrm>
             <a:off x="4617635" y="1227309"/>
-            <a:ext cx="2304942" cy="599286"/>
+            <a:ext cx="2304943" cy="599286"/>
           </a:xfrm>
           <a:prstGeom prst="rect">
             <a:avLst/>
@@ -3848,7 +4111,7 @@
       </p:pic>
       <p:pic>
         <p:nvPicPr>
-          <p:cNvPr id="69" name="pasted-image.tiff"/>
+          <p:cNvPr id="72" name="pasted-image.tiff"/>
           <p:cNvPicPr>
             <a:picLocks noChangeAspect="1"/>
           </p:cNvPicPr>
@@ -3864,7 +4127,7 @@
         </p:blipFill>
         <p:spPr>
           <a:xfrm>
-            <a:off x="5560556" y="2215242"/>
+            <a:off x="5560555" y="2215242"/>
             <a:ext cx="952501" cy="952501"/>
           </a:xfrm>
           <a:prstGeom prst="rect">
@@ -3877,7 +4140,7 @@
       </p:pic>
       <p:pic>
         <p:nvPicPr>
-          <p:cNvPr id="70" name="pasted-image.tiff"/>
+          <p:cNvPr id="73" name="pasted-image.tiff"/>
           <p:cNvPicPr>
             <a:picLocks noChangeAspect="1"/>
           </p:cNvPicPr>
@@ -3893,7 +4156,7 @@
         </p:blipFill>
         <p:spPr>
           <a:xfrm>
-            <a:off x="7137400" y="2684720"/>
+            <a:off x="7137400" y="2684721"/>
             <a:ext cx="950217" cy="950218"/>
           </a:xfrm>
           <a:prstGeom prst="rect">
@@ -3906,7 +4169,7 @@
       </p:pic>
       <p:pic>
         <p:nvPicPr>
-          <p:cNvPr id="71" name="pasted-image.tiff"/>
+          <p:cNvPr id="74" name="pasted-image.tiff"/>
           <p:cNvPicPr>
             <a:picLocks noChangeAspect="1"/>
           </p:cNvPicPr>
@@ -3935,7 +4198,7 @@
       </p:pic>
       <p:pic>
         <p:nvPicPr>
-          <p:cNvPr id="72" name="pasted-image.tiff"/>
+          <p:cNvPr id="75" name="pasted-image.tiff"/>
           <p:cNvPicPr>
             <a:picLocks noChangeAspect="1"/>
           </p:cNvPicPr>
@@ -3971,7 +4234,7 @@
 </p:sld>
 </file>
 
-<file path=ppt/slides/slide8.xml><?xml version="1.0" encoding="utf-8"?>
+<file path=ppt/slides/slide9.xml><?xml version="1.0" encoding="utf-8"?>
 <p:sld xmlns:a="http://schemas.openxmlformats.org/drawingml/2006/main" xmlns:r="http://schemas.openxmlformats.org/officeDocument/2006/relationships" xmlns:p="http://schemas.openxmlformats.org/presentationml/2006/main" showMasterSp="1" showMasterPhAnim="1">
   <p:cSld>
     <p:spTree>
@@ -3990,7 +4253,7 @@
       </p:grpSpPr>
       <p:sp>
         <p:nvSpPr>
-          <p:cNvPr id="74" name="Shape 74"/>
+          <p:cNvPr id="77" name="Shape 77"/>
           <p:cNvSpPr/>
           <p:nvPr>
             <p:ph type="sldNum" sz="quarter" idx="4294967295"/>
@@ -3998,8 +4261,8 @@
         </p:nvSpPr>
         <p:spPr>
           <a:xfrm>
-            <a:off x="9626600" y="6556374"/>
-            <a:ext cx="127001" cy="152401"/>
+            <a:off x="9626600" y="6556375"/>
+            <a:ext cx="127001" cy="152400"/>
           </a:xfrm>
           <a:prstGeom prst="rect">
             <a:avLst/>
@@ -4053,7 +4316,7 @@
       </p:sp>
       <p:sp>
         <p:nvSpPr>
-          <p:cNvPr id="75" name="Shape 75"/>
+          <p:cNvPr id="78" name="Shape 78"/>
           <p:cNvSpPr/>
           <p:nvPr>
             <p:ph type="title"/>
@@ -4081,7 +4344,7 @@
       </p:sp>
       <p:sp>
         <p:nvSpPr>
-          <p:cNvPr id="76" name="Shape 76"/>
+          <p:cNvPr id="79" name="Shape 79"/>
           <p:cNvSpPr/>
           <p:nvPr>
             <p:ph type="body" idx="1"/>
@@ -4145,145 +4408,6 @@
           </a:p>
         </p:txBody>
       </p:sp>
-    </p:spTree>
-  </p:cSld>
-  <p:clrMapOvr>
-    <a:masterClrMapping/>
-  </p:clrMapOvr>
-  <p:transition xmlns:p14="http://schemas.microsoft.com/office/powerpoint/2010/main" spd="med" advClick="1" p14:dur="1000"/>
-</p:sld>
-</file>
-
-<file path=ppt/slides/slide9.xml><?xml version="1.0" encoding="utf-8"?>
-<p:sld xmlns:a="http://schemas.openxmlformats.org/drawingml/2006/main" xmlns:r="http://schemas.openxmlformats.org/officeDocument/2006/relationships" xmlns:p="http://schemas.openxmlformats.org/presentationml/2006/main" showMasterSp="1" showMasterPhAnim="1">
-  <p:cSld>
-    <p:spTree>
-      <p:nvGrpSpPr>
-        <p:cNvPr id="1" name=""/>
-        <p:cNvGrpSpPr/>
-        <p:nvPr/>
-      </p:nvGrpSpPr>
-      <p:grpSpPr>
-        <a:xfrm>
-          <a:off x="0" y="0"/>
-          <a:ext cx="0" cy="0"/>
-          <a:chOff x="0" y="0"/>
-          <a:chExt cx="0" cy="0"/>
-        </a:xfrm>
-      </p:grpSpPr>
-      <p:sp>
-        <p:nvSpPr>
-          <p:cNvPr id="78" name="Shape 78"/>
-          <p:cNvSpPr/>
-          <p:nvPr>
-            <p:ph type="sldNum" sz="quarter" idx="4294967295"/>
-          </p:nvPr>
-        </p:nvSpPr>
-        <p:spPr>
-          <a:xfrm>
-            <a:off x="9576670" y="6556374"/>
-            <a:ext cx="176931" cy="245999"/>
-          </a:xfrm>
-          <a:prstGeom prst="rect">
-            <a:avLst/>
-          </a:prstGeom>
-          <a:extLst>
-            <a:ext uri="{C572A759-6A51-4108-AA02-DFA0A04FC94B}">
-              <ma14:wrappingTextBoxFlag xmlns:ma14="http://schemas.microsoft.com/office/mac/drawingml/2011/main" val="1"/>
-            </a:ext>
-          </a:extLst>
-        </p:spPr>
-        <p:txBody>
-          <a:bodyPr/>
-          <a:lstStyle>
-            <a:lvl1pPr>
-              <a:tabLst>
-                <a:tab pos="457200" algn="l"/>
-                <a:tab pos="914400" algn="l"/>
-                <a:tab pos="1371600" algn="l"/>
-                <a:tab pos="1828800" algn="l"/>
-                <a:tab pos="2286000" algn="l"/>
-                <a:tab pos="2743200" algn="l"/>
-                <a:tab pos="3200400" algn="l"/>
-                <a:tab pos="3657600" algn="l"/>
-                <a:tab pos="4114800" algn="l"/>
-                <a:tab pos="4572000" algn="l"/>
-                <a:tab pos="5029200" algn="l"/>
-                <a:tab pos="5486400" algn="l"/>
-                <a:tab pos="5943600" algn="l"/>
-                <a:tab pos="6400800" algn="l"/>
-                <a:tab pos="6858000" algn="l"/>
-                <a:tab pos="7315200" algn="l"/>
-                <a:tab pos="7772400" algn="l"/>
-                <a:tab pos="8229600" algn="l"/>
-                <a:tab pos="8686800" algn="l"/>
-                <a:tab pos="9144000" algn="l"/>
-              </a:tabLst>
-            </a:lvl1pPr>
-          </a:lstStyle>
-          <a:p>
-            <a:pPr/>
-            <a:fld id="{86CB4B4D-7CA3-9044-876B-883B54F8677D}" type="slidenum"/>
-          </a:p>
-        </p:txBody>
-      </p:sp>
-      <p:sp>
-        <p:nvSpPr>
-          <p:cNvPr id="79" name="Shape 79"/>
-          <p:cNvSpPr/>
-          <p:nvPr>
-            <p:ph type="title"/>
-          </p:nvPr>
-        </p:nvSpPr>
-        <p:spPr>
-          <a:xfrm>
-            <a:off x="495300" y="274636"/>
-            <a:ext cx="8915400" cy="1325564"/>
-          </a:xfrm>
-          <a:prstGeom prst="rect">
-            <a:avLst/>
-          </a:prstGeom>
-        </p:spPr>
-        <p:txBody>
-          <a:bodyPr/>
-          <a:lstStyle/>
-          <a:p>
-            <a:pPr/>
-            <a:r>
-              <a:t>Live Demo</a:t>
-            </a:r>
-          </a:p>
-        </p:txBody>
-      </p:sp>
-      <p:pic>
-        <p:nvPicPr>
-          <p:cNvPr id="80" name="pasted-image.png"/>
-          <p:cNvPicPr>
-            <a:picLocks noChangeAspect="1"/>
-          </p:cNvPicPr>
-          <p:nvPr/>
-        </p:nvPicPr>
-        <p:blipFill>
-          <a:blip r:embed="rId2">
-            <a:extLst/>
-          </a:blip>
-          <a:stretch>
-            <a:fillRect/>
-          </a:stretch>
-        </p:blipFill>
-        <p:spPr>
-          <a:xfrm>
-            <a:off x="232363" y="978211"/>
-            <a:ext cx="9441274" cy="5206378"/>
-          </a:xfrm>
-          <a:prstGeom prst="rect">
-            <a:avLst/>
-          </a:prstGeom>
-          <a:ln w="12700">
-            <a:miter lim="400000"/>
-          </a:ln>
-        </p:spPr>
-      </p:pic>
     </p:spTree>
   </p:cSld>
   <p:clrMapOvr>

</xml_diff>